<commit_message>
Touch up to PPT
</commit_message>
<xml_diff>
--- a/playground.pptx
+++ b/playground.pptx
@@ -596,6 +596,98 @@
     </a:lvl9pPr>
   </p:notesStyle>
 </p:notesMaster>
+</file>
+
+<file path=ppt/notesSlides/notesSlide1.xml><?xml version="1.0" encoding="utf-8"?>
+<p:notes xmlns:a="http://schemas.openxmlformats.org/drawingml/2006/main" xmlns:r="http://schemas.openxmlformats.org/officeDocument/2006/relationships" xmlns:p="http://schemas.openxmlformats.org/presentationml/2006/main">
+  <p:cSld>
+    <p:spTree>
+      <p:nvGrpSpPr>
+        <p:cNvPr id="1" name=""/>
+        <p:cNvGrpSpPr/>
+        <p:nvPr/>
+      </p:nvGrpSpPr>
+      <p:grpSpPr>
+        <a:xfrm>
+          <a:off x="0" y="0"/>
+          <a:ext cx="0" cy="0"/>
+          <a:chOff x="0" y="0"/>
+          <a:chExt cx="0" cy="0"/>
+        </a:xfrm>
+      </p:grpSpPr>
+      <p:sp>
+        <p:nvSpPr>
+          <p:cNvPr id="2" name="Slide Image Placeholder 1"/>
+          <p:cNvSpPr>
+            <a:spLocks noGrp="1" noRot="1" noChangeAspect="1"/>
+          </p:cNvSpPr>
+          <p:nvPr>
+            <p:ph type="sldImg"/>
+          </p:nvPr>
+        </p:nvSpPr>
+        <p:spPr/>
+      </p:sp>
+      <p:sp>
+        <p:nvSpPr>
+          <p:cNvPr id="3" name="Notes Placeholder 2"/>
+          <p:cNvSpPr>
+            <a:spLocks noGrp="1"/>
+          </p:cNvSpPr>
+          <p:nvPr>
+            <p:ph type="body" idx="1"/>
+          </p:nvPr>
+        </p:nvSpPr>
+        <p:spPr/>
+        <p:txBody>
+          <a:bodyPr/>
+          <a:lstStyle/>
+          <a:p>
+            <a:r>
+              <a:rPr lang="en-US" dirty="0" smtClean="0"/>
+              <a:t>Account1 - </a:t>
+            </a:r>
+            <a:r>
+              <a:rPr lang="en-US" dirty="0" err="1" smtClean="0"/>
+              <a:t>monkeyboy</a:t>
+            </a:r>
+            <a:endParaRPr lang="en-US" dirty="0"/>
+          </a:p>
+        </p:txBody>
+      </p:sp>
+      <p:sp>
+        <p:nvSpPr>
+          <p:cNvPr id="4" name="Slide Number Placeholder 3"/>
+          <p:cNvSpPr>
+            <a:spLocks noGrp="1"/>
+          </p:cNvSpPr>
+          <p:nvPr>
+            <p:ph type="sldNum" sz="quarter" idx="10"/>
+          </p:nvPr>
+        </p:nvSpPr>
+        <p:spPr/>
+        <p:txBody>
+          <a:bodyPr/>
+          <a:lstStyle/>
+          <a:p>
+            <a:fld id="{CFA5BF29-3A85-45E8-9EC2-6FCFBE5E0498}" type="slidenum">
+              <a:rPr lang="en-US" smtClean="0"/>
+              <a:t>12</a:t>
+            </a:fld>
+            <a:endParaRPr lang="en-US"/>
+          </a:p>
+        </p:txBody>
+      </p:sp>
+    </p:spTree>
+    <p:extLst>
+      <p:ext uri="{BB962C8B-B14F-4D97-AF65-F5344CB8AC3E}">
+        <p14:creationId xmlns:p14="http://schemas.microsoft.com/office/powerpoint/2010/main" val="1721658684"/>
+      </p:ext>
+    </p:extLst>
+  </p:cSld>
+  <p:clrMapOvr>
+    <a:masterClrMapping/>
+  </p:clrMapOvr>
+</p:notes>
 </file>
 
 <file path=ppt/slideLayouts/slideLayout1.xml><?xml version="1.0" encoding="utf-8"?>
@@ -7940,7 +8032,42 @@
                 <a:ea typeface="Andale Mono" charset="0"/>
                 <a:cs typeface="Andale Mono" charset="0"/>
               </a:rPr>
-              <a:t> wallet</a:t>
+              <a:t> </a:t>
+            </a:r>
+            <a:r>
+              <a:rPr lang="en-US" sz="1400" dirty="0" smtClean="0">
+                <a:latin typeface="Andale Mono" charset="0"/>
+                <a:ea typeface="Andale Mono" charset="0"/>
+                <a:cs typeface="Andale Mono" charset="0"/>
+              </a:rPr>
+              <a:t>wallet</a:t>
+            </a:r>
+          </a:p>
+          <a:p>
+            <a:pPr lvl="1"/>
+            <a:r>
+              <a:rPr lang="en-US" sz="1400" dirty="0">
+                <a:latin typeface="Andale Mono" charset="0"/>
+                <a:ea typeface="Andale Mono" charset="0"/>
+                <a:cs typeface="Andale Mono" charset="0"/>
+              </a:rPr>
+              <a:t>RPC_PORT=8546 ./</a:t>
+            </a:r>
+            <a:r>
+              <a:rPr lang="en-US" sz="1400" dirty="0" err="1">
+                <a:latin typeface="Andale Mono" charset="0"/>
+                <a:ea typeface="Andale Mono" charset="0"/>
+                <a:cs typeface="Andale Mono" charset="0"/>
+              </a:rPr>
+              <a:t>runminer.sh</a:t>
+            </a:r>
+            <a:r>
+              <a:rPr lang="en-US" sz="1400" dirty="0">
+                <a:latin typeface="Andale Mono" charset="0"/>
+                <a:ea typeface="Andale Mono" charset="0"/>
+                <a:cs typeface="Andale Mono" charset="0"/>
+              </a:rPr>
+              <a:t> wallet2</a:t>
             </a:r>
             <a:endParaRPr lang="en-US" sz="1400" dirty="0" smtClean="0">
               <a:latin typeface="Andale Mono" charset="0"/>
@@ -8051,7 +8178,130 @@
                 <a:cs typeface="Andale Mono" charset="0"/>
                 <a:hlinkClick r:id="rId2"/>
               </a:rPr>
-              <a:t>http://localhost:8545</a:t>
+              <a:t>http://</a:t>
+            </a:r>
+            <a:r>
+              <a:rPr lang="en-US" sz="1400" u="sng" dirty="0" smtClean="0">
+                <a:latin typeface="Andale Mono" charset="0"/>
+                <a:ea typeface="Andale Mono" charset="0"/>
+                <a:cs typeface="Andale Mono" charset="0"/>
+                <a:hlinkClick r:id="rId2"/>
+              </a:rPr>
+              <a:t>localhost:8545</a:t>
+            </a:r>
+            <a:endParaRPr lang="en-US" sz="1400" u="sng" dirty="0" smtClean="0">
+              <a:latin typeface="Andale Mono" charset="0"/>
+              <a:ea typeface="Andale Mono" charset="0"/>
+              <a:cs typeface="Andale Mono" charset="0"/>
+            </a:endParaRPr>
+          </a:p>
+          <a:p>
+            <a:pPr lvl="1"/>
+            <a:r>
+              <a:rPr lang="en-US" sz="1400" dirty="0">
+                <a:latin typeface="Andale Mono" charset="0"/>
+                <a:ea typeface="Andale Mono" charset="0"/>
+                <a:cs typeface="Andale Mono" charset="0"/>
+              </a:rPr>
+              <a:t>/Applications/</a:t>
+            </a:r>
+            <a:r>
+              <a:rPr lang="en-US" sz="1400" dirty="0" err="1">
+                <a:latin typeface="Andale Mono" charset="0"/>
+                <a:ea typeface="Andale Mono" charset="0"/>
+                <a:cs typeface="Andale Mono" charset="0"/>
+              </a:rPr>
+              <a:t>Ethereum</a:t>
+            </a:r>
+            <a:r>
+              <a:rPr lang="en-US" sz="1400" dirty="0">
+                <a:latin typeface="Andale Mono" charset="0"/>
+                <a:ea typeface="Andale Mono" charset="0"/>
+                <a:cs typeface="Andale Mono" charset="0"/>
+              </a:rPr>
+              <a:t>\ </a:t>
+            </a:r>
+            <a:r>
+              <a:rPr lang="en-US" sz="1400" dirty="0" err="1">
+                <a:latin typeface="Andale Mono" charset="0"/>
+                <a:ea typeface="Andale Mono" charset="0"/>
+                <a:cs typeface="Andale Mono" charset="0"/>
+              </a:rPr>
+              <a:t>Wallet.app</a:t>
+            </a:r>
+            <a:r>
+              <a:rPr lang="en-US" sz="1400" dirty="0">
+                <a:latin typeface="Andale Mono" charset="0"/>
+                <a:ea typeface="Andale Mono" charset="0"/>
+                <a:cs typeface="Andale Mono" charset="0"/>
+              </a:rPr>
+              <a:t>/Contents/</a:t>
+            </a:r>
+            <a:r>
+              <a:rPr lang="en-US" sz="1400" dirty="0" err="1">
+                <a:latin typeface="Andale Mono" charset="0"/>
+                <a:ea typeface="Andale Mono" charset="0"/>
+                <a:cs typeface="Andale Mono" charset="0"/>
+              </a:rPr>
+              <a:t>MacOS</a:t>
+            </a:r>
+            <a:r>
+              <a:rPr lang="en-US" sz="1400" dirty="0">
+                <a:latin typeface="Andale Mono" charset="0"/>
+                <a:ea typeface="Andale Mono" charset="0"/>
+                <a:cs typeface="Andale Mono" charset="0"/>
+              </a:rPr>
+              <a:t>/</a:t>
+            </a:r>
+            <a:r>
+              <a:rPr lang="en-US" sz="1400" dirty="0" err="1">
+                <a:latin typeface="Andale Mono" charset="0"/>
+                <a:ea typeface="Andale Mono" charset="0"/>
+                <a:cs typeface="Andale Mono" charset="0"/>
+              </a:rPr>
+              <a:t>Ethereum</a:t>
+            </a:r>
+            <a:r>
+              <a:rPr lang="en-US" sz="1400" dirty="0">
+                <a:latin typeface="Andale Mono" charset="0"/>
+                <a:ea typeface="Andale Mono" charset="0"/>
+                <a:cs typeface="Andale Mono" charset="0"/>
+              </a:rPr>
+              <a:t>\ Wallet --</a:t>
+            </a:r>
+            <a:r>
+              <a:rPr lang="en-US" sz="1400" dirty="0" err="1">
+                <a:latin typeface="Andale Mono" charset="0"/>
+                <a:ea typeface="Andale Mono" charset="0"/>
+                <a:cs typeface="Andale Mono" charset="0"/>
+              </a:rPr>
+              <a:t>rpc</a:t>
+            </a:r>
+            <a:r>
+              <a:rPr lang="en-US" sz="1400" dirty="0">
+                <a:latin typeface="Andale Mono" charset="0"/>
+                <a:ea typeface="Andale Mono" charset="0"/>
+                <a:cs typeface="Andale Mono" charset="0"/>
+              </a:rPr>
+              <a:t> </a:t>
+            </a:r>
+            <a:r>
+              <a:rPr lang="en-US" sz="1400" u="sng" dirty="0">
+                <a:latin typeface="Andale Mono" charset="0"/>
+                <a:ea typeface="Andale Mono" charset="0"/>
+                <a:cs typeface="Andale Mono" charset="0"/>
+                <a:hlinkClick r:id="rId3"/>
+              </a:rPr>
+              <a:t>http://</a:t>
+            </a:r>
+            <a:r>
+              <a:rPr lang="en-US" sz="1400" u="sng" dirty="0" smtClean="0">
+                <a:latin typeface="Andale Mono" charset="0"/>
+                <a:ea typeface="Andale Mono" charset="0"/>
+                <a:cs typeface="Andale Mono" charset="0"/>
+                <a:hlinkClick r:id="rId3"/>
+              </a:rPr>
+              <a:t>localhost:8546</a:t>
             </a:r>
             <a:endParaRPr lang="en-US" sz="1400" b="1" dirty="0" smtClean="0">
               <a:latin typeface="Andale Mono" charset="0"/>
@@ -8064,7 +8314,6 @@
               <a:rPr lang="en-US" sz="1600" b="1" dirty="0" smtClean="0"/>
               <a:t>Recipe</a:t>
             </a:r>
-            <a:endParaRPr lang="en-US" sz="1600" b="1" dirty="0" smtClean="0"/>
           </a:p>
           <a:p>
             <a:pPr lvl="1">
@@ -8246,12 +8495,36 @@
           <a:lstStyle/>
           <a:p>
             <a:r>
+              <a:rPr lang="en-US" dirty="0" smtClean="0">
+                <a:latin typeface="Andale Mono" charset="0"/>
+                <a:ea typeface="Andale Mono" charset="0"/>
+                <a:cs typeface="Andale Mono" charset="0"/>
+              </a:rPr>
+              <a:t>ETHERBASE=</a:t>
+            </a:r>
+            <a:r>
+              <a:rPr lang="is-IS" dirty="0">
+                <a:latin typeface="Andale Mono" charset="0"/>
+                <a:ea typeface="Andale Mono" charset="0"/>
+                <a:cs typeface="Andale Mono" charset="0"/>
+              </a:rPr>
+              <a:t>0x8D44C48356C544098F72f1247C9498fd0d582b78</a:t>
+            </a:r>
+            <a:r>
+              <a:rPr lang="en-US" dirty="0" smtClean="0">
+                <a:latin typeface="Andale Mono" charset="0"/>
+                <a:ea typeface="Andale Mono" charset="0"/>
+                <a:cs typeface="Andale Mono" charset="0"/>
+              </a:rPr>
+              <a:t> RPC_PORT=8545 </a:t>
+            </a:r>
+            <a:r>
               <a:rPr lang="en-US" dirty="0">
                 <a:latin typeface="Andale Mono" charset="0"/>
                 <a:ea typeface="Andale Mono" charset="0"/>
                 <a:cs typeface="Andale Mono" charset="0"/>
               </a:rPr>
-              <a:t>ETHERBASE=0xf0bCA61D54E68FBd6aF765bfA4016D6e7Ee7C8f3 RPC_PORT=8545 ./</a:t>
+              <a:t>./</a:t>
             </a:r>
             <a:r>
               <a:rPr lang="en-US" dirty="0" err="1">
@@ -8280,12 +8553,36 @@
           </a:p>
           <a:p>
             <a:r>
+              <a:rPr lang="en-US" dirty="0" smtClean="0">
+                <a:latin typeface="Andale Mono" charset="0"/>
+                <a:ea typeface="Andale Mono" charset="0"/>
+                <a:cs typeface="Andale Mono" charset="0"/>
+              </a:rPr>
+              <a:t>ETHERBASE=</a:t>
+            </a:r>
+            <a:r>
+              <a:rPr lang="nb-NO" dirty="0">
+                <a:latin typeface="Andale Mono" charset="0"/>
+                <a:ea typeface="Andale Mono" charset="0"/>
+                <a:cs typeface="Andale Mono" charset="0"/>
+              </a:rPr>
+              <a:t>0x79A8cCF4f93c2e14C06325647929b9CF12302ba4</a:t>
+            </a:r>
+            <a:r>
+              <a:rPr lang="en-US" dirty="0" smtClean="0">
+                <a:latin typeface="Andale Mono" charset="0"/>
+                <a:ea typeface="Andale Mono" charset="0"/>
+                <a:cs typeface="Andale Mono" charset="0"/>
+              </a:rPr>
+              <a:t> </a:t>
+            </a:r>
+            <a:r>
               <a:rPr lang="en-US" dirty="0">
                 <a:latin typeface="Andale Mono" charset="0"/>
                 <a:ea typeface="Andale Mono" charset="0"/>
                 <a:cs typeface="Andale Mono" charset="0"/>
               </a:rPr>
-              <a:t>ETHERBASE=0x02c2e76A39B4F548DBf5Ab02cA9482268c3649AA RPC_PORT=8546 ./</a:t>
+              <a:t>RPC_PORT=8546 ./</a:t>
             </a:r>
             <a:r>
               <a:rPr lang="en-US" dirty="0" err="1">
@@ -8553,7 +8850,6 @@
               <a:rPr lang="en-US" dirty="0" smtClean="0"/>
               <a:t>Run 3 Node Docker Network</a:t>
             </a:r>
-            <a:endParaRPr lang="en-US" dirty="0" smtClean="0"/>
           </a:p>
           <a:p>
             <a:r>
@@ -8677,7 +8973,6 @@
               <a:rPr lang="en-US" dirty="0" smtClean="0"/>
               <a:t> Sierra 10.12.6 but will run on any Docker host:</a:t>
             </a:r>
-            <a:endParaRPr lang="en-US" dirty="0" smtClean="0"/>
           </a:p>
           <a:p>
             <a:r>
@@ -9003,7 +9298,6 @@
               <a:rPr lang="en-US" sz="1600" b="1" dirty="0" smtClean="0"/>
               <a:t>Recipe</a:t>
             </a:r>
-            <a:endParaRPr lang="en-US" sz="1600" b="1" dirty="0" smtClean="0"/>
           </a:p>
           <a:p>
             <a:pPr lvl="1">
@@ -9038,7 +9332,6 @@
               <a:rPr lang="en-US" sz="1400" dirty="0"/>
               <a:t>;</a:t>
             </a:r>
-            <a:endParaRPr lang="en-US" sz="1400" dirty="0"/>
           </a:p>
           <a:p>
             <a:pPr lvl="1">

</xml_diff>

<commit_message>
Remove reference to vertigo
</commit_message>
<xml_diff>
--- a/playground.pptx
+++ b/playground.pptx
@@ -330,7 +330,7 @@
           <a:p>
             <a:fld id="{07376681-1EC0-4B43-845A-FEE7389147CC}" type="datetimeFigureOut">
               <a:rPr lang="en-US" smtClean="0"/>
-              <a:t>10/7/17</a:t>
+              <a:t>11/30/17</a:t>
             </a:fld>
             <a:endParaRPr lang="en-US"/>
           </a:p>
@@ -9840,28 +9840,36 @@
               </a:rPr>
             </a:br>
             <a:r>
+              <a:rPr lang="en-US" dirty="0" smtClean="0">
+                <a:latin typeface="Andale Mono" charset="0"/>
+                <a:ea typeface="Andale Mono" charset="0"/>
+                <a:cs typeface="Andale Mono" charset="0"/>
+              </a:rPr>
+              <a:t>immutability/</a:t>
+            </a:r>
+            <a:r>
+              <a:rPr lang="en-US" dirty="0" err="1" smtClean="0">
+                <a:latin typeface="Andale Mono" charset="0"/>
+                <a:ea typeface="Andale Mono" charset="0"/>
+                <a:cs typeface="Andale Mono" charset="0"/>
+              </a:rPr>
+              <a:t>ethereum</a:t>
+            </a:r>
+            <a:r>
+              <a:rPr lang="en-US" dirty="0" smtClean="0">
+                <a:latin typeface="Andale Mono" charset="0"/>
+                <a:ea typeface="Andale Mono" charset="0"/>
+                <a:cs typeface="Andale Mono" charset="0"/>
+              </a:rPr>
+              <a:t> </a:t>
+            </a:r>
+            <a:r>
               <a:rPr lang="en-US" dirty="0">
                 <a:latin typeface="Andale Mono" charset="0"/>
                 <a:ea typeface="Andale Mono" charset="0"/>
                 <a:cs typeface="Andale Mono" charset="0"/>
               </a:rPr>
-              <a:t>vertigo/</a:t>
-            </a:r>
-            <a:r>
-              <a:rPr lang="en-US" dirty="0" err="1">
-                <a:latin typeface="Andale Mono" charset="0"/>
-                <a:ea typeface="Andale Mono" charset="0"/>
-                <a:cs typeface="Andale Mono" charset="0"/>
-              </a:rPr>
-              <a:t>ethereum</a:t>
-            </a:r>
-            <a:r>
-              <a:rPr lang="en-US" dirty="0">
-                <a:latin typeface="Andale Mono" charset="0"/>
-                <a:ea typeface="Andale Mono" charset="0"/>
-                <a:cs typeface="Andale Mono" charset="0"/>
-              </a:rPr>
-              <a:t> --</a:t>
+              <a:t>--</a:t>
             </a:r>
             <a:r>
               <a:rPr lang="en-US" dirty="0" smtClean="0">
@@ -10335,28 +10343,36 @@
               </a:rPr>
             </a:br>
             <a:r>
+              <a:rPr lang="en-US" dirty="0" smtClean="0">
+                <a:latin typeface="Andale Mono" charset="0"/>
+                <a:ea typeface="Andale Mono" charset="0"/>
+                <a:cs typeface="Andale Mono" charset="0"/>
+              </a:rPr>
+              <a:t>immutability/</a:t>
+            </a:r>
+            <a:r>
+              <a:rPr lang="en-US" dirty="0" err="1" smtClean="0">
+                <a:latin typeface="Andale Mono" charset="0"/>
+                <a:ea typeface="Andale Mono" charset="0"/>
+                <a:cs typeface="Andale Mono" charset="0"/>
+              </a:rPr>
+              <a:t>ethereum</a:t>
+            </a:r>
+            <a:r>
+              <a:rPr lang="en-US" dirty="0" smtClean="0">
+                <a:latin typeface="Andale Mono" charset="0"/>
+                <a:ea typeface="Andale Mono" charset="0"/>
+                <a:cs typeface="Andale Mono" charset="0"/>
+              </a:rPr>
+              <a:t> </a:t>
+            </a:r>
+            <a:r>
               <a:rPr lang="en-US" dirty="0">
                 <a:latin typeface="Andale Mono" charset="0"/>
                 <a:ea typeface="Andale Mono" charset="0"/>
                 <a:cs typeface="Andale Mono" charset="0"/>
               </a:rPr>
-              <a:t>vertigo/</a:t>
-            </a:r>
-            <a:r>
-              <a:rPr lang="en-US" dirty="0" err="1">
-                <a:latin typeface="Andale Mono" charset="0"/>
-                <a:ea typeface="Andale Mono" charset="0"/>
-                <a:cs typeface="Andale Mono" charset="0"/>
-              </a:rPr>
-              <a:t>ethereum</a:t>
-            </a:r>
-            <a:r>
-              <a:rPr lang="en-US" dirty="0">
-                <a:latin typeface="Andale Mono" charset="0"/>
-                <a:ea typeface="Andale Mono" charset="0"/>
-                <a:cs typeface="Andale Mono" charset="0"/>
-              </a:rPr>
-              <a:t> --identity $NODE_NAME --cache=512</a:t>
+              <a:t>--identity $NODE_NAME --cache=512</a:t>
             </a:r>
             <a:endParaRPr lang="en-US" dirty="0" smtClean="0">
               <a:latin typeface="Andale Mono" charset="0"/>

</xml_diff>